<commit_message>
Fixed parking, compensated for extra weight.
</commit_message>
<xml_diff>
--- a/2013nKISA.pptx
+++ b/2013nKISA.pptx
@@ -227,7 +227,7 @@
             <a:fld id="{7DAA9D1F-A101-4D8F-95A3-880C74B85695}" type="datetimeFigureOut">
               <a:rPr lang="en-US" smtClean="0"/>
               <a:pPr/>
-              <a:t>2013-04-01</a:t>
+              <a:t>2013-04-05</a:t>
             </a:fld>
             <a:endParaRPr lang="en-US"/>
           </a:p>
@@ -394,7 +394,7 @@
             <a:fld id="{8D833577-F39A-4FF8-8EFC-276784B793B8}" type="datetimeFigureOut">
               <a:rPr lang="en-US" smtClean="0"/>
               <a:pPr/>
-              <a:t>2013-04-01</a:t>
+              <a:t>2013-04-05</a:t>
             </a:fld>
             <a:endParaRPr lang="en-US"/>
           </a:p>
@@ -1490,19 +1490,11 @@
           <a:p>
             <a:r>
               <a:rPr lang="en-US" dirty="0" smtClean="0"/>
-              <a:t>Ethan – improve comparison between old fashioned knight/horse </a:t>
-            </a:r>
-            <a:r>
-              <a:rPr lang="en-US" dirty="0" smtClean="0"/>
-              <a:t>and air warfare</a:t>
+              <a:t>Ethan – improve comparison between old fashioned knight/horse and air warfare</a:t>
             </a:r>
             <a:r>
               <a:rPr lang="en-US" baseline="0" dirty="0" smtClean="0"/>
-              <a:t> now as new battle ground </a:t>
-            </a:r>
-            <a:r>
-              <a:rPr lang="en-US" baseline="0" dirty="0" smtClean="0"/>
-              <a:t>– go Ethan!!!</a:t>
+              <a:t> now as new battle ground – go Ethan!!!</a:t>
             </a:r>
           </a:p>
           <a:p>
@@ -1603,15 +1595,7 @@
             </a:r>
             <a:r>
               <a:rPr lang="en-US" baseline="0" dirty="0" smtClean="0"/>
-              <a:t>– </a:t>
-            </a:r>
-            <a:r>
-              <a:rPr lang="en-US" baseline="0" dirty="0" smtClean="0"/>
-              <a:t>work out between you two how you want to do </a:t>
-            </a:r>
-            <a:r>
-              <a:rPr lang="en-US" baseline="0" dirty="0" smtClean="0"/>
-              <a:t>this. ONE MINUTE LONG.</a:t>
+              <a:t>– work out between you two how you want to do this. ONE MINUTE LONG.</a:t>
             </a:r>
             <a:endParaRPr lang="en-US" dirty="0"/>
           </a:p>
@@ -1702,19 +1686,7 @@
           <a:p>
             <a:r>
               <a:rPr lang="en-US" baseline="0" dirty="0" smtClean="0"/>
-              <a:t>Josh </a:t>
-            </a:r>
-            <a:r>
-              <a:rPr lang="en-US" baseline="0" dirty="0" smtClean="0"/>
-              <a:t>– wave around </a:t>
-            </a:r>
-            <a:r>
-              <a:rPr lang="en-US" baseline="0" dirty="0" smtClean="0"/>
-              <a:t>plastic </a:t>
-            </a:r>
-            <a:r>
-              <a:rPr lang="en-US" baseline="0" dirty="0" smtClean="0"/>
-              <a:t>treads – then flash to next picture for CAD of Prototype 1 </a:t>
+              <a:t>Josh – wave around plastic treads – then flash to next picture for CAD of Prototype 1 </a:t>
             </a:r>
           </a:p>
           <a:p>
@@ -1906,11 +1878,7 @@
           <a:p>
             <a:r>
               <a:rPr lang="en-US" baseline="0" dirty="0" smtClean="0"/>
-              <a:t>Josh </a:t>
-            </a:r>
-            <a:r>
-              <a:rPr lang="en-US" baseline="0" dirty="0" smtClean="0"/>
-              <a:t>– wave around rubber treads – then flash to next picture for CAD of Prototype 1 </a:t>
+              <a:t>Josh – wave around rubber treads – then flash to next picture for CAD of Prototype 1 </a:t>
             </a:r>
           </a:p>
           <a:p>
@@ -2007,11 +1975,7 @@
           <a:p>
             <a:r>
               <a:rPr lang="en-US" dirty="0" smtClean="0"/>
-              <a:t>Josh </a:t>
-            </a:r>
-            <a:r>
-              <a:rPr lang="en-US" dirty="0" smtClean="0"/>
-              <a:t>– point out NXT</a:t>
+              <a:t>Josh – point out NXT</a:t>
             </a:r>
             <a:r>
               <a:rPr lang="en-US" baseline="0" dirty="0" smtClean="0"/>
@@ -2366,7 +2330,7 @@
             <a:fld id="{6A61A13D-63DF-49CA-BF1D-4A4E7F3B9583}" type="datetimeFigureOut">
               <a:rPr lang="en-US" smtClean="0"/>
               <a:pPr/>
-              <a:t>2013-04-01</a:t>
+              <a:t>2013-04-05</a:t>
             </a:fld>
             <a:endParaRPr lang="en-US"/>
           </a:p>
@@ -2594,7 +2558,7 @@
             <a:fld id="{6A61A13D-63DF-49CA-BF1D-4A4E7F3B9583}" type="datetimeFigureOut">
               <a:rPr lang="en-US" smtClean="0"/>
               <a:pPr/>
-              <a:t>2013-04-01</a:t>
+              <a:t>2013-04-05</a:t>
             </a:fld>
             <a:endParaRPr lang="en-US"/>
           </a:p>
@@ -2771,7 +2735,7 @@
             <a:fld id="{6A61A13D-63DF-49CA-BF1D-4A4E7F3B9583}" type="datetimeFigureOut">
               <a:rPr lang="en-US" smtClean="0"/>
               <a:pPr/>
-              <a:t>2013-04-01</a:t>
+              <a:t>2013-04-05</a:t>
             </a:fld>
             <a:endParaRPr lang="en-US"/>
           </a:p>
@@ -2938,7 +2902,7 @@
             <a:fld id="{6A61A13D-63DF-49CA-BF1D-4A4E7F3B9583}" type="datetimeFigureOut">
               <a:rPr lang="en-US" smtClean="0"/>
               <a:pPr/>
-              <a:t>2013-04-01</a:t>
+              <a:t>2013-04-05</a:t>
             </a:fld>
             <a:endParaRPr lang="en-US"/>
           </a:p>
@@ -3184,7 +3148,7 @@
             <a:fld id="{6A61A13D-63DF-49CA-BF1D-4A4E7F3B9583}" type="datetimeFigureOut">
               <a:rPr lang="en-US" smtClean="0"/>
               <a:pPr/>
-              <a:t>2013-04-01</a:t>
+              <a:t>2013-04-05</a:t>
             </a:fld>
             <a:endParaRPr lang="en-US"/>
           </a:p>
@@ -3450,7 +3414,7 @@
             <a:fld id="{6A61A13D-63DF-49CA-BF1D-4A4E7F3B9583}" type="datetimeFigureOut">
               <a:rPr lang="en-US" smtClean="0"/>
               <a:pPr/>
-              <a:t>2013-04-01</a:t>
+              <a:t>2013-04-05</a:t>
             </a:fld>
             <a:endParaRPr lang="en-US"/>
           </a:p>
@@ -3826,7 +3790,7 @@
             <a:fld id="{6A61A13D-63DF-49CA-BF1D-4A4E7F3B9583}" type="datetimeFigureOut">
               <a:rPr lang="en-US" smtClean="0"/>
               <a:pPr/>
-              <a:t>2013-04-01</a:t>
+              <a:t>2013-04-05</a:t>
             </a:fld>
             <a:endParaRPr lang="en-US"/>
           </a:p>
@@ -3941,7 +3905,7 @@
             <a:fld id="{6A61A13D-63DF-49CA-BF1D-4A4E7F3B9583}" type="datetimeFigureOut">
               <a:rPr lang="en-US" smtClean="0"/>
               <a:pPr/>
-              <a:t>2013-04-01</a:t>
+              <a:t>2013-04-05</a:t>
             </a:fld>
             <a:endParaRPr lang="en-US"/>
           </a:p>
@@ -4033,7 +3997,7 @@
             <a:fld id="{6A61A13D-63DF-49CA-BF1D-4A4E7F3B9583}" type="datetimeFigureOut">
               <a:rPr lang="en-US" smtClean="0"/>
               <a:pPr/>
-              <a:t>2013-04-01</a:t>
+              <a:t>2013-04-05</a:t>
             </a:fld>
             <a:endParaRPr lang="en-US"/>
           </a:p>
@@ -4293,7 +4257,7 @@
             <a:fld id="{6A61A13D-63DF-49CA-BF1D-4A4E7F3B9583}" type="datetimeFigureOut">
               <a:rPr lang="en-US" smtClean="0"/>
               <a:pPr/>
-              <a:t>2013-04-01</a:t>
+              <a:t>2013-04-05</a:t>
             </a:fld>
             <a:endParaRPr lang="en-US"/>
           </a:p>
@@ -4559,7 +4523,7 @@
             <a:fld id="{6A61A13D-63DF-49CA-BF1D-4A4E7F3B9583}" type="datetimeFigureOut">
               <a:rPr lang="en-US" smtClean="0"/>
               <a:pPr/>
-              <a:t>2013-04-01</a:t>
+              <a:t>2013-04-05</a:t>
             </a:fld>
             <a:endParaRPr lang="en-US"/>
           </a:p>
@@ -4778,7 +4742,7 @@
             <a:fld id="{6A61A13D-63DF-49CA-BF1D-4A4E7F3B9583}" type="datetimeFigureOut">
               <a:rPr lang="en-US" smtClean="0"/>
               <a:pPr/>
-              <a:t>2013-04-01</a:t>
+              <a:t>2013-04-05</a:t>
             </a:fld>
             <a:endParaRPr lang="en-US"/>
           </a:p>
@@ -8515,23 +8479,6 @@
               </a:rPr>
               <a:t>Bringing these new people into the fold was a fairly smooth seamless operation</a:t>
             </a:r>
-            <a:endParaRPr lang="en-US" b="1" spc="150" dirty="0" smtClean="0">
-              <a:ln w="11430"/>
-              <a:solidFill>
-                <a:schemeClr val="accent1">
-                  <a:lumMod val="60000"/>
-                  <a:lumOff val="40000"/>
-                </a:schemeClr>
-              </a:solidFill>
-              <a:effectLst>
-                <a:outerShdw blurRad="25400" algn="tl" rotWithShape="0">
-                  <a:srgbClr val="000000">
-                    <a:alpha val="43000"/>
-                  </a:srgbClr>
-                </a:outerShdw>
-              </a:effectLst>
-              <a:latin typeface="+mj-lt"/>
-            </a:endParaRPr>
           </a:p>
           <a:p>
             <a:r>
@@ -8554,23 +8501,6 @@
               </a:rPr>
               <a:t>Starting this year, we had more experience than before, so we could get working on the robot straightaway.</a:t>
             </a:r>
-            <a:endParaRPr lang="en-US" b="1" spc="150" dirty="0" smtClean="0">
-              <a:ln w="11430"/>
-              <a:solidFill>
-                <a:schemeClr val="accent1">
-                  <a:lumMod val="60000"/>
-                  <a:lumOff val="40000"/>
-                </a:schemeClr>
-              </a:solidFill>
-              <a:effectLst>
-                <a:outerShdw blurRad="25400" algn="tl" rotWithShape="0">
-                  <a:srgbClr val="000000">
-                    <a:alpha val="43000"/>
-                  </a:srgbClr>
-                </a:outerShdw>
-              </a:effectLst>
-              <a:latin typeface="+mj-lt"/>
-            </a:endParaRPr>
           </a:p>
           <a:p>
             <a:r>

</xml_diff>

<commit_message>
Updated programming and ROBOTC Bugs slided
</commit_message>
<xml_diff>
--- a/2013nKISA.pptx
+++ b/2013nKISA.pptx
@@ -227,7 +227,7 @@
             <a:fld id="{7DAA9D1F-A101-4D8F-95A3-880C74B85695}" type="datetimeFigureOut">
               <a:rPr lang="en-US" smtClean="0"/>
               <a:pPr/>
-              <a:t>2013-04-05</a:t>
+              <a:t>2013-04-09</a:t>
             </a:fld>
             <a:endParaRPr lang="en-US"/>
           </a:p>
@@ -394,7 +394,7 @@
             <a:fld id="{8D833577-F39A-4FF8-8EFC-276784B793B8}" type="datetimeFigureOut">
               <a:rPr lang="en-US" smtClean="0"/>
               <a:pPr/>
-              <a:t>2013-04-05</a:t>
+              <a:t>2013-04-09</a:t>
             </a:fld>
             <a:endParaRPr lang="en-US"/>
           </a:p>
@@ -2330,7 +2330,7 @@
             <a:fld id="{6A61A13D-63DF-49CA-BF1D-4A4E7F3B9583}" type="datetimeFigureOut">
               <a:rPr lang="en-US" smtClean="0"/>
               <a:pPr/>
-              <a:t>2013-04-05</a:t>
+              <a:t>2013-04-09</a:t>
             </a:fld>
             <a:endParaRPr lang="en-US"/>
           </a:p>
@@ -2558,7 +2558,7 @@
             <a:fld id="{6A61A13D-63DF-49CA-BF1D-4A4E7F3B9583}" type="datetimeFigureOut">
               <a:rPr lang="en-US" smtClean="0"/>
               <a:pPr/>
-              <a:t>2013-04-05</a:t>
+              <a:t>2013-04-09</a:t>
             </a:fld>
             <a:endParaRPr lang="en-US"/>
           </a:p>
@@ -2735,7 +2735,7 @@
             <a:fld id="{6A61A13D-63DF-49CA-BF1D-4A4E7F3B9583}" type="datetimeFigureOut">
               <a:rPr lang="en-US" smtClean="0"/>
               <a:pPr/>
-              <a:t>2013-04-05</a:t>
+              <a:t>2013-04-09</a:t>
             </a:fld>
             <a:endParaRPr lang="en-US"/>
           </a:p>
@@ -2902,7 +2902,7 @@
             <a:fld id="{6A61A13D-63DF-49CA-BF1D-4A4E7F3B9583}" type="datetimeFigureOut">
               <a:rPr lang="en-US" smtClean="0"/>
               <a:pPr/>
-              <a:t>2013-04-05</a:t>
+              <a:t>2013-04-09</a:t>
             </a:fld>
             <a:endParaRPr lang="en-US"/>
           </a:p>
@@ -3148,7 +3148,7 @@
             <a:fld id="{6A61A13D-63DF-49CA-BF1D-4A4E7F3B9583}" type="datetimeFigureOut">
               <a:rPr lang="en-US" smtClean="0"/>
               <a:pPr/>
-              <a:t>2013-04-05</a:t>
+              <a:t>2013-04-09</a:t>
             </a:fld>
             <a:endParaRPr lang="en-US"/>
           </a:p>
@@ -3414,7 +3414,7 @@
             <a:fld id="{6A61A13D-63DF-49CA-BF1D-4A4E7F3B9583}" type="datetimeFigureOut">
               <a:rPr lang="en-US" smtClean="0"/>
               <a:pPr/>
-              <a:t>2013-04-05</a:t>
+              <a:t>2013-04-09</a:t>
             </a:fld>
             <a:endParaRPr lang="en-US"/>
           </a:p>
@@ -3790,7 +3790,7 @@
             <a:fld id="{6A61A13D-63DF-49CA-BF1D-4A4E7F3B9583}" type="datetimeFigureOut">
               <a:rPr lang="en-US" smtClean="0"/>
               <a:pPr/>
-              <a:t>2013-04-05</a:t>
+              <a:t>2013-04-09</a:t>
             </a:fld>
             <a:endParaRPr lang="en-US"/>
           </a:p>
@@ -3905,7 +3905,7 @@
             <a:fld id="{6A61A13D-63DF-49CA-BF1D-4A4E7F3B9583}" type="datetimeFigureOut">
               <a:rPr lang="en-US" smtClean="0"/>
               <a:pPr/>
-              <a:t>2013-04-05</a:t>
+              <a:t>2013-04-09</a:t>
             </a:fld>
             <a:endParaRPr lang="en-US"/>
           </a:p>
@@ -3997,7 +3997,7 @@
             <a:fld id="{6A61A13D-63DF-49CA-BF1D-4A4E7F3B9583}" type="datetimeFigureOut">
               <a:rPr lang="en-US" smtClean="0"/>
               <a:pPr/>
-              <a:t>2013-04-05</a:t>
+              <a:t>2013-04-09</a:t>
             </a:fld>
             <a:endParaRPr lang="en-US"/>
           </a:p>
@@ -4257,7 +4257,7 @@
             <a:fld id="{6A61A13D-63DF-49CA-BF1D-4A4E7F3B9583}" type="datetimeFigureOut">
               <a:rPr lang="en-US" smtClean="0"/>
               <a:pPr/>
-              <a:t>2013-04-05</a:t>
+              <a:t>2013-04-09</a:t>
             </a:fld>
             <a:endParaRPr lang="en-US"/>
           </a:p>
@@ -4523,7 +4523,7 @@
             <a:fld id="{6A61A13D-63DF-49CA-BF1D-4A4E7F3B9583}" type="datetimeFigureOut">
               <a:rPr lang="en-US" smtClean="0"/>
               <a:pPr/>
-              <a:t>2013-04-05</a:t>
+              <a:t>2013-04-09</a:t>
             </a:fld>
             <a:endParaRPr lang="en-US"/>
           </a:p>
@@ -4742,7 +4742,7 @@
             <a:fld id="{6A61A13D-63DF-49CA-BF1D-4A4E7F3B9583}" type="datetimeFigureOut">
               <a:rPr lang="en-US" smtClean="0"/>
               <a:pPr/>
-              <a:t>2013-04-05</a:t>
+              <a:t>2013-04-09</a:t>
             </a:fld>
             <a:endParaRPr lang="en-US"/>
           </a:p>
@@ -5403,8 +5403,45 @@
                 </a:effectLst>
                 <a:latin typeface="+mj-lt"/>
               </a:rPr>
-              <a:t>Systematic list of 3-digit direction codes</a:t>
-            </a:r>
+              <a:t>Systematic list of 3-digit direction </a:t>
+            </a:r>
+            <a:r>
+              <a:rPr lang="en-US" b="1" spc="150" dirty="0" smtClean="0">
+                <a:ln w="11430"/>
+                <a:solidFill>
+                  <a:schemeClr val="accent1">
+                    <a:lumMod val="60000"/>
+                    <a:lumOff val="40000"/>
+                  </a:schemeClr>
+                </a:solidFill>
+                <a:effectLst>
+                  <a:outerShdw blurRad="25400" algn="tl" rotWithShape="0">
+                    <a:srgbClr val="000000">
+                      <a:alpha val="43000"/>
+                    </a:srgbClr>
+                  </a:outerShdw>
+                </a:effectLst>
+                <a:latin typeface="+mj-lt"/>
+              </a:rPr>
+              <a:t>codes, fully decodes at the beginning of the program</a:t>
+            </a:r>
+            <a:endParaRPr lang="en-US" b="1" spc="150" dirty="0" smtClean="0">
+              <a:ln w="11430"/>
+              <a:solidFill>
+                <a:schemeClr val="accent1">
+                  <a:lumMod val="60000"/>
+                  <a:lumOff val="40000"/>
+                </a:schemeClr>
+              </a:solidFill>
+              <a:effectLst>
+                <a:outerShdw blurRad="25400" algn="tl" rotWithShape="0">
+                  <a:srgbClr val="000000">
+                    <a:alpha val="43000"/>
+                  </a:srgbClr>
+                </a:outerShdw>
+              </a:effectLst>
+              <a:latin typeface="+mj-lt"/>
+            </a:endParaRPr>
           </a:p>
           <a:p>
             <a:pPr>
@@ -6419,8 +6456,67 @@
                 </a:effectLst>
                 <a:latin typeface="+mj-lt"/>
               </a:rPr>
-              <a:t>Conservative use of sensors – color sensor used as both color and light sensors simultaneously</a:t>
-            </a:r>
+              <a:t>Conservative use of sensors – color sensor used as both color and light sensors </a:t>
+            </a:r>
+            <a:r>
+              <a:rPr lang="en-US" b="1" spc="150" dirty="0" smtClean="0">
+                <a:ln w="11430"/>
+                <a:solidFill>
+                  <a:schemeClr val="accent1">
+                    <a:lumMod val="60000"/>
+                    <a:lumOff val="40000"/>
+                  </a:schemeClr>
+                </a:solidFill>
+                <a:effectLst>
+                  <a:outerShdw blurRad="25400" algn="tl" rotWithShape="0">
+                    <a:srgbClr val="000000">
+                      <a:alpha val="43000"/>
+                    </a:srgbClr>
+                  </a:outerShdw>
+                </a:effectLst>
+                <a:latin typeface="+mj-lt"/>
+              </a:rPr>
+              <a:t>simultaneously</a:t>
+            </a:r>
+          </a:p>
+          <a:p>
+            <a:r>
+              <a:rPr lang="en-US" b="1" spc="150" dirty="0" smtClean="0">
+                <a:ln w="11430"/>
+                <a:solidFill>
+                  <a:schemeClr val="accent1">
+                    <a:lumMod val="60000"/>
+                    <a:lumOff val="40000"/>
+                  </a:schemeClr>
+                </a:solidFill>
+                <a:effectLst>
+                  <a:outerShdw blurRad="25400" algn="tl" rotWithShape="0">
+                    <a:srgbClr val="000000">
+                      <a:alpha val="43000"/>
+                    </a:srgbClr>
+                  </a:outerShdw>
+                </a:effectLst>
+                <a:latin typeface="+mj-lt"/>
+              </a:rPr>
+              <a:t>Motor distance coefficient, changeable to account for more or less traction on road surface</a:t>
+            </a:r>
+            <a:endParaRPr lang="en-US" b="1" spc="150" dirty="0" smtClean="0">
+              <a:ln w="11430"/>
+              <a:solidFill>
+                <a:schemeClr val="accent1">
+                  <a:lumMod val="60000"/>
+                  <a:lumOff val="40000"/>
+                </a:schemeClr>
+              </a:solidFill>
+              <a:effectLst>
+                <a:outerShdw blurRad="25400" algn="tl" rotWithShape="0">
+                  <a:srgbClr val="000000">
+                    <a:alpha val="43000"/>
+                  </a:srgbClr>
+                </a:outerShdw>
+              </a:effectLst>
+              <a:latin typeface="+mj-lt"/>
+            </a:endParaRPr>
           </a:p>
           <a:p>
             <a:endParaRPr lang="en-US" b="1" spc="150" dirty="0" smtClean="0">
@@ -7723,6 +7819,26 @@
           <a:lstStyle/>
           <a:p>
             <a:r>
+              <a:rPr lang="en-US" b="1" spc="150" dirty="0" err="1" smtClean="0">
+                <a:ln w="11430"/>
+                <a:solidFill>
+                  <a:schemeClr val="accent1">
+                    <a:lumMod val="60000"/>
+                    <a:lumOff val="40000"/>
+                  </a:schemeClr>
+                </a:solidFill>
+                <a:effectLst>
+                  <a:outerShdw blurRad="25400" algn="tl" rotWithShape="0">
+                    <a:srgbClr val="000000">
+                      <a:alpha val="43000"/>
+                    </a:srgbClr>
+                  </a:outerShdw>
+                </a:effectLst>
+                <a:latin typeface="+mj-lt"/>
+              </a:rPr>
+              <a:t>getColorSensorData</a:t>
+            </a:r>
+            <a:r>
               <a:rPr lang="en-US" b="1" spc="150" dirty="0" smtClean="0">
                 <a:ln w="11430"/>
                 <a:solidFill>
@@ -7740,32 +7856,8 @@
                 </a:effectLst>
                 <a:latin typeface="+mj-lt"/>
               </a:rPr>
-              <a:t>We found that the only some ROBOTC commands recognize our one reversed motor and we had to work around that</a:t>
-            </a:r>
-          </a:p>
-          <a:p>
-            <a:r>
-              <a:rPr lang="en-US" b="1" spc="150" dirty="0" smtClean="0">
-                <a:ln w="11430"/>
-                <a:solidFill>
-                  <a:schemeClr val="accent1">
-                    <a:lumMod val="60000"/>
-                    <a:lumOff val="40000"/>
-                  </a:schemeClr>
-                </a:solidFill>
-                <a:effectLst>
-                  <a:outerShdw blurRad="25400" algn="tl" rotWithShape="0">
-                    <a:srgbClr val="000000">
-                      <a:alpha val="43000"/>
-                    </a:srgbClr>
-                  </a:outerShdw>
-                </a:effectLst>
-                <a:latin typeface="+mj-lt"/>
-              </a:rPr>
-              <a:t>We found that when we set the motor PID off, after a synched turn it would remain on</a:t>
-            </a:r>
-          </a:p>
-          <a:p>
+              <a:t> command was not working, submitted support ticket, received Beta version to fix the problem</a:t>
+            </a:r>
             <a:endParaRPr lang="en-US" b="1" spc="150" dirty="0">
               <a:ln w="11430"/>
               <a:solidFill>
@@ -7810,6 +7902,30 @@
           <a:xfrm>
             <a:off x="457200" y="228600"/>
             <a:ext cx="1352661" cy="1780587"/>
+          </a:xfrm>
+          <a:prstGeom prst="rect">
+            <a:avLst/>
+          </a:prstGeom>
+        </p:spPr>
+      </p:pic>
+      <p:pic>
+        <p:nvPicPr>
+          <p:cNvPr id="4" name="Picture 3"/>
+          <p:cNvPicPr>
+            <a:picLocks noChangeAspect="1"/>
+          </p:cNvPicPr>
+          <p:nvPr/>
+        </p:nvPicPr>
+        <p:blipFill>
+          <a:blip r:embed="rId4"/>
+          <a:stretch>
+            <a:fillRect/>
+          </a:stretch>
+        </p:blipFill>
+        <p:spPr>
+          <a:xfrm>
+            <a:off x="457199" y="3992880"/>
+            <a:ext cx="8229601" cy="381000"/>
           </a:xfrm>
           <a:prstGeom prst="rect">
             <a:avLst/>
@@ -9547,12 +9663,18 @@
         </p:nvSpPr>
         <p:spPr/>
         <p:txBody>
-          <a:bodyPr/>
+          <a:bodyPr>
+            <a:normAutofit/>
+          </a:bodyPr>
           <a:lstStyle/>
           <a:p>
             <a:r>
               <a:rPr lang="en-US" dirty="0" smtClean="0"/>
-              <a:t>Prototype 2</a:t>
+              <a:t>Prototype </a:t>
+            </a:r>
+            <a:r>
+              <a:rPr lang="en-US" dirty="0" smtClean="0"/>
+              <a:t>3</a:t>
             </a:r>
             <a:endParaRPr lang="en-US" dirty="0"/>
           </a:p>
@@ -9569,7 +9691,7 @@
           </p:nvPr>
         </p:nvPicPr>
         <p:blipFill>
-          <a:blip r:embed="rId3">
+          <a:blip r:embed="rId3" cstate="print">
             <a:extLst>
               <a:ext uri="{28A0092B-C50C-407E-A947-70E740481C1C}">
                 <a14:useLocalDpi xmlns:a14="http://schemas.microsoft.com/office/drawing/2010/main" val="0"/>
@@ -9583,7 +9705,7 @@
         <p:spPr>
           <a:xfrm>
             <a:off x="1432983" y="1600200"/>
-            <a:ext cx="6278033" cy="4708524"/>
+            <a:ext cx="6278032" cy="4708524"/>
           </a:xfrm>
         </p:spPr>
       </p:pic>

</xml_diff>